<commit_message>
bundle and minification and cdn demo added
</commit_message>
<xml_diff>
--- a/EmptyProject/Slides.pptx
+++ b/EmptyProject/Slides.pptx
@@ -212,7 +212,7 @@
           <a:p>
             <a:fld id="{89EC5367-D7F6-45B2-A116-EA915C4B1310}" type="datetimeFigureOut">
               <a:rPr lang="en-US" smtClean="0"/>
-              <a:t>1/11/2017</a:t>
+              <a:t>1/12/2017</a:t>
             </a:fld>
             <a:endParaRPr lang="en-US"/>
           </a:p>
@@ -1426,7 +1426,7 @@
           <a:p>
             <a:fld id="{C0F3BAF6-6DB2-4A07-AEEA-A0824374C276}" type="datetimeFigureOut">
               <a:rPr lang="en-US" smtClean="0"/>
-              <a:t>1/11/2017</a:t>
+              <a:t>1/12/2017</a:t>
             </a:fld>
             <a:endParaRPr lang="en-US"/>
           </a:p>
@@ -1594,7 +1594,7 @@
           <a:p>
             <a:fld id="{C0F3BAF6-6DB2-4A07-AEEA-A0824374C276}" type="datetimeFigureOut">
               <a:rPr lang="en-US" smtClean="0"/>
-              <a:t>1/11/2017</a:t>
+              <a:t>1/12/2017</a:t>
             </a:fld>
             <a:endParaRPr lang="en-US"/>
           </a:p>
@@ -1772,7 +1772,7 @@
           <a:p>
             <a:fld id="{C0F3BAF6-6DB2-4A07-AEEA-A0824374C276}" type="datetimeFigureOut">
               <a:rPr lang="en-US" smtClean="0"/>
-              <a:t>1/11/2017</a:t>
+              <a:t>1/12/2017</a:t>
             </a:fld>
             <a:endParaRPr lang="en-US"/>
           </a:p>
@@ -1940,7 +1940,7 @@
           <a:p>
             <a:fld id="{C0F3BAF6-6DB2-4A07-AEEA-A0824374C276}" type="datetimeFigureOut">
               <a:rPr lang="en-US" smtClean="0"/>
-              <a:t>1/11/2017</a:t>
+              <a:t>1/12/2017</a:t>
             </a:fld>
             <a:endParaRPr lang="en-US"/>
           </a:p>
@@ -2185,7 +2185,7 @@
           <a:p>
             <a:fld id="{C0F3BAF6-6DB2-4A07-AEEA-A0824374C276}" type="datetimeFigureOut">
               <a:rPr lang="en-US" smtClean="0"/>
-              <a:t>1/11/2017</a:t>
+              <a:t>1/12/2017</a:t>
             </a:fld>
             <a:endParaRPr lang="en-US"/>
           </a:p>
@@ -2414,7 +2414,7 @@
           <a:p>
             <a:fld id="{C0F3BAF6-6DB2-4A07-AEEA-A0824374C276}" type="datetimeFigureOut">
               <a:rPr lang="en-US" smtClean="0"/>
-              <a:t>1/11/2017</a:t>
+              <a:t>1/12/2017</a:t>
             </a:fld>
             <a:endParaRPr lang="en-US"/>
           </a:p>
@@ -2778,7 +2778,7 @@
           <a:p>
             <a:fld id="{C0F3BAF6-6DB2-4A07-AEEA-A0824374C276}" type="datetimeFigureOut">
               <a:rPr lang="en-US" smtClean="0"/>
-              <a:t>1/11/2017</a:t>
+              <a:t>1/12/2017</a:t>
             </a:fld>
             <a:endParaRPr lang="en-US"/>
           </a:p>
@@ -2895,7 +2895,7 @@
           <a:p>
             <a:fld id="{C0F3BAF6-6DB2-4A07-AEEA-A0824374C276}" type="datetimeFigureOut">
               <a:rPr lang="en-US" smtClean="0"/>
-              <a:t>1/11/2017</a:t>
+              <a:t>1/12/2017</a:t>
             </a:fld>
             <a:endParaRPr lang="en-US"/>
           </a:p>
@@ -2990,7 +2990,7 @@
           <a:p>
             <a:fld id="{C0F3BAF6-6DB2-4A07-AEEA-A0824374C276}" type="datetimeFigureOut">
               <a:rPr lang="en-US" smtClean="0"/>
-              <a:t>1/11/2017</a:t>
+              <a:t>1/12/2017</a:t>
             </a:fld>
             <a:endParaRPr lang="en-US"/>
           </a:p>
@@ -3265,7 +3265,7 @@
           <a:p>
             <a:fld id="{C0F3BAF6-6DB2-4A07-AEEA-A0824374C276}" type="datetimeFigureOut">
               <a:rPr lang="en-US" smtClean="0"/>
-              <a:t>1/11/2017</a:t>
+              <a:t>1/12/2017</a:t>
             </a:fld>
             <a:endParaRPr lang="en-US"/>
           </a:p>
@@ -3517,7 +3517,7 @@
           <a:p>
             <a:fld id="{C0F3BAF6-6DB2-4A07-AEEA-A0824374C276}" type="datetimeFigureOut">
               <a:rPr lang="en-US" smtClean="0"/>
-              <a:t>1/11/2017</a:t>
+              <a:t>1/12/2017</a:t>
             </a:fld>
             <a:endParaRPr lang="en-US"/>
           </a:p>
@@ -3728,7 +3728,7 @@
           <a:p>
             <a:fld id="{C0F3BAF6-6DB2-4A07-AEEA-A0824374C276}" type="datetimeFigureOut">
               <a:rPr lang="en-US" smtClean="0"/>
-              <a:t>1/11/2017</a:t>
+              <a:t>1/12/2017</a:t>
             </a:fld>
             <a:endParaRPr lang="en-US"/>
           </a:p>
@@ -4525,7 +4525,7 @@
         <p:spPr>
           <a:xfrm>
             <a:off x="832104" y="1713851"/>
-            <a:ext cx="10436972" cy="3970318"/>
+            <a:ext cx="10436972" cy="3293209"/>
           </a:xfrm>
           <a:prstGeom prst="rect">
             <a:avLst/>
@@ -4538,69 +4538,151 @@
           <a:lstStyle/>
           <a:p>
             <a:pPr marL="457200" indent="-457200">
-              <a:lnSpc>
-                <a:spcPct val="150000"/>
-              </a:lnSpc>
+              <a:spcBef>
+                <a:spcPts val="600"/>
+              </a:spcBef>
+              <a:spcAft>
+                <a:spcPts val="600"/>
+              </a:spcAft>
               <a:buFont typeface="Wingdings" panose="05000000000000000000" pitchFamily="2" charset="2"/>
               <a:buChar char="ü"/>
             </a:pPr>
             <a:r>
-              <a:rPr lang="en-US" sz="2800" dirty="0"/>
+              <a:rPr lang="en-US" sz="2400" dirty="0">
+                <a:solidFill>
+                  <a:schemeClr val="bg1">
+                    <a:lumMod val="50000"/>
+                  </a:schemeClr>
+                </a:solidFill>
+              </a:rPr>
               <a:t>CDN would allow users to get static content (</a:t>
             </a:r>
             <a:r>
-              <a:rPr lang="en-US" sz="2800" dirty="0" err="1"/>
+              <a:rPr lang="en-US" sz="2400" dirty="0" err="1">
+                <a:solidFill>
+                  <a:schemeClr val="bg1">
+                    <a:lumMod val="50000"/>
+                  </a:schemeClr>
+                </a:solidFill>
+              </a:rPr>
               <a:t>css</a:t>
             </a:r>
             <a:r>
-              <a:rPr lang="en-US" sz="2800" dirty="0"/>
+              <a:rPr lang="en-US" sz="2400" dirty="0">
+                <a:solidFill>
+                  <a:schemeClr val="bg1">
+                    <a:lumMod val="50000"/>
+                  </a:schemeClr>
+                </a:solidFill>
+              </a:rPr>
               <a:t>, </a:t>
             </a:r>
             <a:r>
-              <a:rPr lang="en-US" sz="2800" dirty="0" err="1"/>
+              <a:rPr lang="en-US" sz="2400" dirty="0" err="1">
+                <a:solidFill>
+                  <a:schemeClr val="bg1">
+                    <a:lumMod val="50000"/>
+                  </a:schemeClr>
+                </a:solidFill>
+              </a:rPr>
               <a:t>js</a:t>
             </a:r>
             <a:r>
-              <a:rPr lang="en-US" sz="2800" dirty="0"/>
-              <a:t>, images files) from closer source.</a:t>
+              <a:rPr lang="en-US" sz="2400" dirty="0">
+                <a:solidFill>
+                  <a:schemeClr val="bg1">
+                    <a:lumMod val="50000"/>
+                  </a:schemeClr>
+                </a:solidFill>
+              </a:rPr>
+              <a:t>, image files) from closer source</a:t>
             </a:r>
           </a:p>
           <a:p>
             <a:pPr marL="457200" indent="-457200">
-              <a:lnSpc>
-                <a:spcPct val="150000"/>
-              </a:lnSpc>
+              <a:spcBef>
+                <a:spcPts val="600"/>
+              </a:spcBef>
+              <a:spcAft>
+                <a:spcPts val="600"/>
+              </a:spcAft>
               <a:buFont typeface="Wingdings" panose="05000000000000000000" pitchFamily="2" charset="2"/>
               <a:buChar char="ü"/>
             </a:pPr>
             <a:r>
-              <a:rPr lang="en-US" sz="2800" dirty="0"/>
-              <a:t>Consider using your CDN for all the static files, this releases huge load from server.</a:t>
+              <a:rPr lang="en-US" sz="2400" dirty="0">
+                <a:solidFill>
+                  <a:schemeClr val="bg1">
+                    <a:lumMod val="50000"/>
+                  </a:schemeClr>
+                </a:solidFill>
+              </a:rPr>
+              <a:t>Consider using your CDN for all the static files, this releases huge load from server</a:t>
             </a:r>
           </a:p>
           <a:p>
             <a:pPr marL="457200" indent="-457200">
-              <a:lnSpc>
-                <a:spcPct val="150000"/>
-              </a:lnSpc>
+              <a:spcBef>
+                <a:spcPts val="600"/>
+              </a:spcBef>
+              <a:spcAft>
+                <a:spcPts val="600"/>
+              </a:spcAft>
               <a:buFont typeface="Wingdings" panose="05000000000000000000" pitchFamily="2" charset="2"/>
               <a:buChar char="ü"/>
             </a:pPr>
             <a:r>
-              <a:rPr lang="en-US" sz="2800" dirty="0"/>
-              <a:t>C# Corner uses CDN</a:t>
+              <a:rPr lang="en-US" sz="2400" dirty="0">
+                <a:solidFill>
+                  <a:schemeClr val="bg1">
+                    <a:lumMod val="50000"/>
+                  </a:schemeClr>
+                </a:solidFill>
+              </a:rPr>
+              <a:t>Consider using CDN on minified and bundles output too</a:t>
             </a:r>
           </a:p>
           <a:p>
             <a:pPr marL="457200" indent="-457200">
-              <a:lnSpc>
-                <a:spcPct val="150000"/>
-              </a:lnSpc>
+              <a:spcBef>
+                <a:spcPts val="600"/>
+              </a:spcBef>
+              <a:spcAft>
+                <a:spcPts val="600"/>
+              </a:spcAft>
               <a:buFont typeface="Wingdings" panose="05000000000000000000" pitchFamily="2" charset="2"/>
               <a:buChar char="ü"/>
             </a:pPr>
             <a:r>
-              <a:rPr lang="en-US" sz="2800" dirty="0"/>
+              <a:rPr lang="en-US" sz="2400" dirty="0">
+                <a:solidFill>
+                  <a:schemeClr val="bg1">
+                    <a:lumMod val="50000"/>
+                  </a:schemeClr>
+                </a:solidFill>
+              </a:rPr>
+              <a:t>C# Corner uses CDN</a:t>
+            </a:r>
+          </a:p>
+          <a:p>
+            <a:pPr marL="457200" indent="-457200">
+              <a:spcBef>
+                <a:spcPts val="600"/>
+              </a:spcBef>
+              <a:spcAft>
+                <a:spcPts val="600"/>
+              </a:spcAft>
+              <a:buFont typeface="Wingdings" panose="05000000000000000000" pitchFamily="2" charset="2"/>
+              <a:buChar char="ü"/>
+            </a:pPr>
+            <a:r>
+              <a:rPr lang="en-US" sz="2400" dirty="0">
+                <a:solidFill>
+                  <a:schemeClr val="bg1">
+                    <a:lumMod val="50000"/>
+                  </a:schemeClr>
+                </a:solidFill>
+              </a:rPr>
               <a:t>Stack-Overflow uses CDN</a:t>
             </a:r>
           </a:p>
@@ -4745,7 +4827,7 @@
         <p:spPr>
           <a:xfrm>
             <a:off x="716910" y="3511233"/>
-            <a:ext cx="11904221" cy="523220"/>
+            <a:ext cx="8574399" cy="400110"/>
           </a:xfrm>
           <a:prstGeom prst="rect">
             <a:avLst/>
@@ -4759,7 +4841,7 @@
           <a:lstStyle/>
           <a:p>
             <a:r>
-              <a:rPr lang="en-US" sz="2800" dirty="0">
+              <a:rPr lang="en-US" sz="2000" dirty="0">
                 <a:solidFill>
                   <a:srgbClr val="FF0000"/>
                 </a:solidFill>
@@ -4908,7 +4990,7 @@
         <p:spPr>
           <a:xfrm>
             <a:off x="902751" y="1673664"/>
-            <a:ext cx="10471919" cy="3903504"/>
+            <a:ext cx="10471919" cy="2769989"/>
           </a:xfrm>
           <a:prstGeom prst="rect">
             <a:avLst/>
@@ -4921,48 +5003,84 @@
           <a:lstStyle/>
           <a:p>
             <a:pPr marL="457200" indent="-457200">
-              <a:lnSpc>
-                <a:spcPct val="150000"/>
-              </a:lnSpc>
+              <a:spcBef>
+                <a:spcPts val="600"/>
+              </a:spcBef>
+              <a:spcAft>
+                <a:spcPts val="600"/>
+              </a:spcAft>
               <a:buFont typeface="Wingdings" panose="05000000000000000000" pitchFamily="2" charset="2"/>
               <a:buChar char="ü"/>
             </a:pPr>
             <a:r>
-              <a:rPr lang="en-US" sz="2800" dirty="0"/>
+              <a:rPr lang="en-US" sz="2400" dirty="0">
+                <a:solidFill>
+                  <a:schemeClr val="bg1">
+                    <a:lumMod val="50000"/>
+                  </a:schemeClr>
+                </a:solidFill>
+              </a:rPr>
               <a:t>In Debug Mode your DLL has debug information inside of it (source code, variable names, symbolic information and other similar stuff).</a:t>
             </a:r>
           </a:p>
           <a:p>
             <a:pPr marL="457200" indent="-457200">
-              <a:lnSpc>
-                <a:spcPct val="150000"/>
-              </a:lnSpc>
+              <a:spcBef>
+                <a:spcPts val="600"/>
+              </a:spcBef>
+              <a:spcAft>
+                <a:spcPts val="600"/>
+              </a:spcAft>
               <a:buFont typeface="Wingdings" panose="05000000000000000000" pitchFamily="2" charset="2"/>
               <a:buChar char="ü"/>
             </a:pPr>
             <a:r>
-              <a:rPr lang="en-US" sz="2800" dirty="0"/>
+              <a:rPr lang="en-US" sz="2400" dirty="0">
+                <a:solidFill>
+                  <a:schemeClr val="bg1">
+                    <a:lumMod val="50000"/>
+                  </a:schemeClr>
+                </a:solidFill>
+              </a:rPr>
               <a:t>Debug Mode creates PDB file to store debug information</a:t>
             </a:r>
           </a:p>
           <a:p>
             <a:pPr>
-              <a:lnSpc>
-                <a:spcPct val="150000"/>
-              </a:lnSpc>
+              <a:spcBef>
+                <a:spcPts val="600"/>
+              </a:spcBef>
+              <a:spcAft>
+                <a:spcPts val="600"/>
+              </a:spcAft>
             </a:pPr>
-            <a:endParaRPr lang="en-US" sz="2800" dirty="0"/>
+            <a:endParaRPr lang="en-US" sz="2400" dirty="0">
+              <a:solidFill>
+                <a:schemeClr val="bg1">
+                  <a:lumMod val="50000"/>
+                </a:schemeClr>
+              </a:solidFill>
+            </a:endParaRPr>
           </a:p>
           <a:p>
             <a:pPr marL="457200" indent="-457200">
-              <a:lnSpc>
-                <a:spcPct val="150000"/>
-              </a:lnSpc>
+              <a:spcBef>
+                <a:spcPts val="600"/>
+              </a:spcBef>
+              <a:spcAft>
+                <a:spcPts val="600"/>
+              </a:spcAft>
               <a:buFont typeface="Wingdings" panose="05000000000000000000" pitchFamily="2" charset="2"/>
               <a:buChar char="ü"/>
             </a:pPr>
             <a:r>
-              <a:rPr lang="en-US" sz="2800" dirty="0"/>
+              <a:rPr lang="en-US" sz="2400" dirty="0">
+                <a:solidFill>
+                  <a:schemeClr val="bg1">
+                    <a:lumMod val="50000"/>
+                  </a:schemeClr>
+                </a:solidFill>
+              </a:rPr>
               <a:t>In Release Mode your DLL lack of debug information makes it smaller and probably performs better due to its smaller footprint.</a:t>
             </a:r>
           </a:p>
@@ -5121,15 +5239,20 @@
           <a:p>
             <a:pPr marL="285750" indent="-285750">
               <a:spcBef>
-                <a:spcPts val="1200"/>
+                <a:spcPts val="600"/>
               </a:spcBef>
+              <a:spcAft>
+                <a:spcPts val="600"/>
+              </a:spcAft>
               <a:buFont typeface="Wingdings" panose="05000000000000000000" pitchFamily="2" charset="2"/>
               <a:buChar char="ü"/>
             </a:pPr>
             <a:r>
               <a:rPr lang="en-US" sz="2000" dirty="0">
                 <a:solidFill>
-                  <a:srgbClr val="505050"/>
+                  <a:schemeClr val="bg1">
+                    <a:lumMod val="50000"/>
+                  </a:schemeClr>
                 </a:solidFill>
                 <a:latin typeface="Segoe UI" panose="020B0502040204020203" pitchFamily="34" charset="0"/>
               </a:rPr>
@@ -5139,15 +5262,20 @@
           <a:p>
             <a:pPr marL="285750" indent="-285750">
               <a:spcBef>
-                <a:spcPts val="1200"/>
+                <a:spcPts val="600"/>
               </a:spcBef>
+              <a:spcAft>
+                <a:spcPts val="600"/>
+              </a:spcAft>
               <a:buFont typeface="Wingdings" panose="05000000000000000000" pitchFamily="2" charset="2"/>
               <a:buChar char="ü"/>
             </a:pPr>
             <a:r>
               <a:rPr lang="en-US" sz="2000" dirty="0">
                 <a:solidFill>
-                  <a:srgbClr val="505050"/>
+                  <a:schemeClr val="bg1">
+                    <a:lumMod val="50000"/>
+                  </a:schemeClr>
                 </a:solidFill>
                 <a:latin typeface="Segoe UI" panose="020B0502040204020203" pitchFamily="34" charset="0"/>
               </a:rPr>
@@ -5157,15 +5285,20 @@
           <a:p>
             <a:pPr marL="285750" indent="-285750">
               <a:spcBef>
-                <a:spcPts val="1200"/>
+                <a:spcPts val="600"/>
               </a:spcBef>
+              <a:spcAft>
+                <a:spcPts val="600"/>
+              </a:spcAft>
               <a:buFont typeface="Wingdings" panose="05000000000000000000" pitchFamily="2" charset="2"/>
               <a:buChar char="ü"/>
             </a:pPr>
             <a:r>
               <a:rPr lang="en-US" sz="2000" dirty="0">
                 <a:solidFill>
-                  <a:srgbClr val="505050"/>
+                  <a:schemeClr val="bg1">
+                    <a:lumMod val="50000"/>
+                  </a:schemeClr>
                 </a:solidFill>
                 <a:latin typeface="Segoe UI" panose="020B0502040204020203" pitchFamily="34" charset="0"/>
               </a:rPr>
@@ -5175,15 +5308,20 @@
           <a:p>
             <a:pPr marL="285750" indent="-285750">
               <a:spcBef>
-                <a:spcPts val="1200"/>
+                <a:spcPts val="600"/>
               </a:spcBef>
+              <a:spcAft>
+                <a:spcPts val="600"/>
+              </a:spcAft>
               <a:buFont typeface="Wingdings" panose="05000000000000000000" pitchFamily="2" charset="2"/>
               <a:buChar char="ü"/>
             </a:pPr>
             <a:r>
               <a:rPr lang="en-US" sz="2000" dirty="0">
                 <a:solidFill>
-                  <a:srgbClr val="505050"/>
+                  <a:schemeClr val="bg1">
+                    <a:lumMod val="50000"/>
+                  </a:schemeClr>
                 </a:solidFill>
                 <a:latin typeface="Segoe UI" panose="020B0502040204020203" pitchFamily="34" charset="0"/>
               </a:rPr>
@@ -5193,15 +5331,20 @@
           <a:p>
             <a:pPr marL="285750" indent="-285750">
               <a:spcBef>
-                <a:spcPts val="1200"/>
+                <a:spcPts val="600"/>
               </a:spcBef>
+              <a:spcAft>
+                <a:spcPts val="600"/>
+              </a:spcAft>
               <a:buFont typeface="Wingdings" panose="05000000000000000000" pitchFamily="2" charset="2"/>
               <a:buChar char="ü"/>
             </a:pPr>
             <a:r>
               <a:rPr lang="en-US" sz="2000" dirty="0">
                 <a:solidFill>
-                  <a:srgbClr val="505050"/>
+                  <a:schemeClr val="bg1">
+                    <a:lumMod val="50000"/>
+                  </a:schemeClr>
                 </a:solidFill>
                 <a:latin typeface="Segoe UI" panose="020B0502040204020203" pitchFamily="34" charset="0"/>
               </a:rPr>
@@ -5356,13 +5499,21 @@
             <a:r>
               <a:rPr lang="en-US" dirty="0">
                 <a:solidFill>
-                  <a:srgbClr val="505050"/>
+                  <a:schemeClr val="bg1">
+                    <a:lumMod val="50000"/>
+                  </a:schemeClr>
                 </a:solidFill>
                 <a:latin typeface="Segoe UI" panose="020B0502040204020203" pitchFamily="34" charset="0"/>
               </a:rPr>
               <a:t>Need to write this </a:t>
             </a:r>
-            <a:endParaRPr lang="en-US" dirty="0"/>
+            <a:endParaRPr lang="en-US" dirty="0">
+              <a:solidFill>
+                <a:schemeClr val="bg1">
+                  <a:lumMod val="50000"/>
+                </a:schemeClr>
+              </a:solidFill>
+            </a:endParaRPr>
           </a:p>
         </p:txBody>
       </p:sp>
@@ -6105,22 +6256,21 @@
             <a:r>
               <a:rPr lang="en-US" dirty="0">
                 <a:solidFill>
-                  <a:srgbClr val="505050"/>
+                  <a:schemeClr val="bg1">
+                    <a:lumMod val="50000"/>
+                  </a:schemeClr>
                 </a:solidFill>
                 <a:latin typeface="Segoe UI" panose="020B0502040204020203" pitchFamily="34" charset="0"/>
               </a:rPr>
-              <a:t>Need to </a:t>
-            </a:r>
-            <a:r>
-              <a:rPr lang="en-US">
-                <a:solidFill>
-                  <a:srgbClr val="505050"/>
-                </a:solidFill>
-                <a:latin typeface="Segoe UI" panose="020B0502040204020203" pitchFamily="34" charset="0"/>
-              </a:rPr>
-              <a:t>write this </a:t>
-            </a:r>
-            <a:endParaRPr lang="en-US" dirty="0"/>
+              <a:t>Need to write this </a:t>
+            </a:r>
+            <a:endParaRPr lang="en-US" dirty="0">
+              <a:solidFill>
+                <a:schemeClr val="bg1">
+                  <a:lumMod val="50000"/>
+                </a:schemeClr>
+              </a:solidFill>
+            </a:endParaRPr>
           </a:p>
         </p:txBody>
       </p:sp>
@@ -6356,7 +6506,9 @@
             <a:r>
               <a:rPr lang="en-US" sz="2800" dirty="0">
                 <a:solidFill>
-                  <a:srgbClr val="505050"/>
+                  <a:schemeClr val="bg1">
+                    <a:lumMod val="50000"/>
+                  </a:schemeClr>
                 </a:solidFill>
                 <a:latin typeface="Segoe UI" panose="020B0502040204020203" pitchFamily="34" charset="0"/>
               </a:rPr>
@@ -6374,7 +6526,9 @@
             <a:r>
               <a:rPr lang="en-US" sz="2800" dirty="0">
                 <a:solidFill>
-                  <a:srgbClr val="505050"/>
+                  <a:schemeClr val="bg1">
+                    <a:lumMod val="50000"/>
+                  </a:schemeClr>
                 </a:solidFill>
                 <a:latin typeface="Segoe UI" panose="020B0502040204020203" pitchFamily="34" charset="0"/>
               </a:rPr>
@@ -6392,7 +6546,9 @@
             <a:r>
               <a:rPr lang="en-US" sz="2800" dirty="0">
                 <a:solidFill>
-                  <a:srgbClr val="505050"/>
+                  <a:schemeClr val="bg1">
+                    <a:lumMod val="50000"/>
+                  </a:schemeClr>
                 </a:solidFill>
                 <a:latin typeface="Segoe UI" panose="020B0502040204020203" pitchFamily="34" charset="0"/>
               </a:rPr>
@@ -6401,7 +6557,9 @@
             <a:r>
               <a:rPr lang="en-US" sz="2800" dirty="0" err="1">
                 <a:solidFill>
-                  <a:srgbClr val="505050"/>
+                  <a:schemeClr val="bg1">
+                    <a:lumMod val="50000"/>
+                  </a:schemeClr>
                 </a:solidFill>
                 <a:latin typeface="Segoe UI" panose="020B0502040204020203" pitchFamily="34" charset="0"/>
               </a:rPr>
@@ -6409,7 +6567,9 @@
             </a:r>
             <a:endParaRPr lang="en-US" sz="2800" dirty="0">
               <a:solidFill>
-                <a:srgbClr val="505050"/>
+                <a:schemeClr val="bg1">
+                  <a:lumMod val="50000"/>
+                </a:schemeClr>
               </a:solidFill>
               <a:latin typeface="Segoe UI" panose="020B0502040204020203" pitchFamily="34" charset="0"/>
             </a:endParaRPr>
@@ -6425,7 +6585,9 @@
             <a:r>
               <a:rPr lang="en-US" sz="2800" dirty="0">
                 <a:solidFill>
-                  <a:srgbClr val="505050"/>
+                  <a:schemeClr val="bg1">
+                    <a:lumMod val="50000"/>
+                  </a:schemeClr>
                 </a:solidFill>
                 <a:latin typeface="Segoe UI" panose="020B0502040204020203" pitchFamily="34" charset="0"/>
               </a:rPr>
@@ -6443,7 +6605,9 @@
             <a:r>
               <a:rPr lang="en-US" sz="2800" dirty="0">
                 <a:solidFill>
-                  <a:srgbClr val="505050"/>
+                  <a:schemeClr val="bg1">
+                    <a:lumMod val="50000"/>
+                  </a:schemeClr>
                 </a:solidFill>
                 <a:latin typeface="Segoe UI" panose="020B0502040204020203" pitchFamily="34" charset="0"/>
               </a:rPr>
@@ -6461,7 +6625,9 @@
             <a:r>
               <a:rPr lang="en-US" sz="2800" dirty="0">
                 <a:solidFill>
-                  <a:srgbClr val="505050"/>
+                  <a:schemeClr val="bg1">
+                    <a:lumMod val="50000"/>
+                  </a:schemeClr>
                 </a:solidFill>
                 <a:latin typeface="Segoe UI" panose="020B0502040204020203" pitchFamily="34" charset="0"/>
               </a:rPr>
@@ -6479,7 +6645,9 @@
             <a:r>
               <a:rPr lang="en-US" sz="2800" dirty="0">
                 <a:solidFill>
-                  <a:srgbClr val="505050"/>
+                  <a:schemeClr val="bg1">
+                    <a:lumMod val="50000"/>
+                  </a:schemeClr>
                 </a:solidFill>
                 <a:latin typeface="Segoe UI" panose="020B0502040204020203" pitchFamily="34" charset="0"/>
               </a:rPr>
@@ -6497,7 +6665,9 @@
             <a:r>
               <a:rPr lang="en-US" sz="2800" dirty="0">
                 <a:solidFill>
-                  <a:srgbClr val="505050"/>
+                  <a:schemeClr val="bg1">
+                    <a:lumMod val="50000"/>
+                  </a:schemeClr>
                 </a:solidFill>
                 <a:latin typeface="Segoe UI" panose="020B0502040204020203" pitchFamily="34" charset="0"/>
               </a:rPr>
@@ -6650,7 +6820,13 @@
           <a:lstStyle/>
           <a:p>
             <a:r>
-              <a:rPr lang="en-US" sz="4800" dirty="0"/>
+              <a:rPr lang="en-US" sz="4800" dirty="0">
+                <a:solidFill>
+                  <a:schemeClr val="bg1">
+                    <a:lumMod val="50000"/>
+                  </a:schemeClr>
+                </a:solidFill>
+              </a:rPr>
               <a:t>Before deploying your app on production or staging we should always look at every possible way to improve performance and monitor how your app doing online.</a:t>
             </a:r>
           </a:p>
@@ -6819,7 +6995,7 @@
         <p:spPr>
           <a:xfrm>
             <a:off x="925290" y="1490007"/>
-            <a:ext cx="10631649" cy="4493538"/>
+            <a:ext cx="10631649" cy="3954929"/>
           </a:xfrm>
           <a:prstGeom prst="rect">
             <a:avLst/>
@@ -6845,58 +7021,90 @@
           </a:p>
           <a:p>
             <a:pPr marL="285750" indent="-285750">
-              <a:lnSpc>
-                <a:spcPct val="150000"/>
-              </a:lnSpc>
+              <a:spcBef>
+                <a:spcPts val="600"/>
+              </a:spcBef>
+              <a:spcAft>
+                <a:spcPts val="600"/>
+              </a:spcAft>
               <a:buFont typeface="Wingdings" panose="05000000000000000000" pitchFamily="2" charset="2"/>
               <a:buChar char="ü"/>
             </a:pPr>
             <a:r>
-              <a:rPr lang="en-US" sz="2800" dirty="0"/>
+              <a:rPr lang="en-US" sz="2800" dirty="0">
+                <a:solidFill>
+                  <a:schemeClr val="bg1">
+                    <a:lumMod val="50000"/>
+                  </a:schemeClr>
+                </a:solidFill>
+              </a:rPr>
               <a:t>Detect and diagnose exceptions and application performance issues</a:t>
             </a:r>
           </a:p>
           <a:p>
             <a:pPr marL="285750" indent="-285750">
-              <a:lnSpc>
-                <a:spcPct val="150000"/>
-              </a:lnSpc>
+              <a:spcBef>
+                <a:spcPts val="600"/>
+              </a:spcBef>
+              <a:spcAft>
+                <a:spcPts val="600"/>
+              </a:spcAft>
               <a:buFont typeface="Wingdings" panose="05000000000000000000" pitchFamily="2" charset="2"/>
               <a:buChar char="ü"/>
             </a:pPr>
             <a:r>
-              <a:rPr lang="en-US" sz="2800" dirty="0"/>
+              <a:rPr lang="en-US" sz="2800" dirty="0">
+                <a:solidFill>
+                  <a:schemeClr val="bg1">
+                    <a:lumMod val="50000"/>
+                  </a:schemeClr>
+                </a:solidFill>
+              </a:rPr>
               <a:t>Monitor Azure websites or container hosted or shared hosted</a:t>
             </a:r>
           </a:p>
           <a:p>
             <a:pPr marL="285750" indent="-285750">
-              <a:lnSpc>
-                <a:spcPct val="150000"/>
-              </a:lnSpc>
+              <a:spcBef>
+                <a:spcPts val="600"/>
+              </a:spcBef>
+              <a:spcAft>
+                <a:spcPts val="600"/>
+              </a:spcAft>
               <a:buFont typeface="Wingdings" panose="05000000000000000000" pitchFamily="2" charset="2"/>
               <a:buChar char="ü"/>
             </a:pPr>
             <a:r>
-              <a:rPr lang="en-US" sz="2800" dirty="0"/>
+              <a:rPr lang="en-US" sz="2800" dirty="0">
+                <a:solidFill>
+                  <a:schemeClr val="bg1">
+                    <a:lumMod val="50000"/>
+                  </a:schemeClr>
+                </a:solidFill>
+              </a:rPr>
               <a:t>Seamlessly integrate with your DevOps pipeline using Visual Studio Team Services, GitHub</a:t>
             </a:r>
           </a:p>
           <a:p>
             <a:pPr marL="285750" indent="-285750">
-              <a:lnSpc>
-                <a:spcPct val="150000"/>
-              </a:lnSpc>
+              <a:spcBef>
+                <a:spcPts val="600"/>
+              </a:spcBef>
+              <a:spcAft>
+                <a:spcPts val="600"/>
+              </a:spcAft>
               <a:buFont typeface="Wingdings" panose="05000000000000000000" pitchFamily="2" charset="2"/>
               <a:buChar char="ü"/>
             </a:pPr>
             <a:r>
-              <a:rPr lang="en-US" sz="2800" dirty="0"/>
-              <a:t>Get started from within Visual Studio or </a:t>
-            </a:r>
-            <a:r>
-              <a:rPr lang="en-US" sz="2800" dirty="0"/>
-              <a:t>monitor existing apps</a:t>
+              <a:rPr lang="en-US" sz="2800" dirty="0">
+                <a:solidFill>
+                  <a:schemeClr val="bg1">
+                    <a:lumMod val="50000"/>
+                  </a:schemeClr>
+                </a:solidFill>
+              </a:rPr>
+              <a:t>Get started from within Visual Studio or monitor existing apps</a:t>
             </a:r>
           </a:p>
         </p:txBody>
@@ -7039,8 +7247,8 @@
         </p:nvSpPr>
         <p:spPr>
           <a:xfrm>
-            <a:off x="1267345" y="2160522"/>
-            <a:ext cx="10644403" cy="3754874"/>
+            <a:off x="1267345" y="2296556"/>
+            <a:ext cx="10644403" cy="3231654"/>
           </a:xfrm>
           <a:prstGeom prst="rect">
             <a:avLst/>
@@ -7053,7 +7261,7 @@
           <a:lstStyle/>
           <a:p>
             <a:r>
-              <a:rPr lang="en-GB" sz="1400" dirty="0">
+              <a:rPr lang="en-GB" sz="1200" dirty="0">
                 <a:solidFill>
                   <a:srgbClr val="000000"/>
                 </a:solidFill>
@@ -7062,7 +7270,7 @@
               <a:t>[</a:t>
             </a:r>
             <a:r>
-              <a:rPr lang="en-GB" sz="1400" dirty="0" err="1">
+              <a:rPr lang="en-GB" sz="1200" dirty="0" err="1">
                 <a:solidFill>
                   <a:srgbClr val="2B91AF"/>
                 </a:solidFill>
@@ -7071,7 +7279,7 @@
               <a:t>AttributeUsage</a:t>
             </a:r>
             <a:r>
-              <a:rPr lang="en-GB" sz="1400" dirty="0">
+              <a:rPr lang="en-GB" sz="1200" dirty="0">
                 <a:solidFill>
                   <a:srgbClr val="000000"/>
                 </a:solidFill>
@@ -7080,7 +7288,7 @@
               <a:t>(</a:t>
             </a:r>
             <a:r>
-              <a:rPr lang="en-GB" sz="1400" dirty="0" err="1">
+              <a:rPr lang="en-GB" sz="1200" dirty="0" err="1">
                 <a:solidFill>
                   <a:srgbClr val="2B91AF"/>
                 </a:solidFill>
@@ -7089,7 +7297,7 @@
               <a:t>AttributeTargets</a:t>
             </a:r>
             <a:r>
-              <a:rPr lang="en-GB" sz="1400" dirty="0" err="1">
+              <a:rPr lang="en-GB" sz="1200" dirty="0" err="1">
                 <a:solidFill>
                   <a:srgbClr val="000000"/>
                 </a:solidFill>
@@ -7098,7 +7306,7 @@
               <a:t>.Class</a:t>
             </a:r>
             <a:r>
-              <a:rPr lang="en-GB" sz="1400" dirty="0">
+              <a:rPr lang="en-GB" sz="1200" dirty="0">
                 <a:solidFill>
                   <a:srgbClr val="000000"/>
                 </a:solidFill>
@@ -7107,7 +7315,7 @@
               <a:t> | </a:t>
             </a:r>
             <a:r>
-              <a:rPr lang="en-GB" sz="1400" dirty="0" err="1">
+              <a:rPr lang="en-GB" sz="1200" dirty="0" err="1">
                 <a:solidFill>
                   <a:srgbClr val="2B91AF"/>
                 </a:solidFill>
@@ -7116,7 +7324,7 @@
               <a:t>AttributeTargets</a:t>
             </a:r>
             <a:r>
-              <a:rPr lang="en-GB" sz="1400" dirty="0" err="1">
+              <a:rPr lang="en-GB" sz="1200" dirty="0" err="1">
                 <a:solidFill>
                   <a:srgbClr val="000000"/>
                 </a:solidFill>
@@ -7125,7 +7333,7 @@
               <a:t>.Method</a:t>
             </a:r>
             <a:r>
-              <a:rPr lang="en-GB" sz="1400" dirty="0">
+              <a:rPr lang="en-GB" sz="1200" dirty="0">
                 <a:solidFill>
                   <a:srgbClr val="000000"/>
                 </a:solidFill>
@@ -7134,7 +7342,7 @@
               <a:t>, Inherited = </a:t>
             </a:r>
             <a:r>
-              <a:rPr lang="en-GB" sz="1400" dirty="0">
+              <a:rPr lang="en-GB" sz="1200" dirty="0">
                 <a:solidFill>
                   <a:srgbClr val="0000FF"/>
                 </a:solidFill>
@@ -7143,7 +7351,7 @@
               <a:t>true</a:t>
             </a:r>
             <a:r>
-              <a:rPr lang="en-GB" sz="1400" dirty="0">
+              <a:rPr lang="en-GB" sz="1200" dirty="0">
                 <a:solidFill>
                   <a:srgbClr val="000000"/>
                 </a:solidFill>
@@ -7152,7 +7360,7 @@
               <a:t>, </a:t>
             </a:r>
             <a:r>
-              <a:rPr lang="en-GB" sz="1400" dirty="0" err="1">
+              <a:rPr lang="en-GB" sz="1200" dirty="0" err="1">
                 <a:solidFill>
                   <a:srgbClr val="000000"/>
                 </a:solidFill>
@@ -7161,7 +7369,7 @@
               <a:t>AllowMultiple</a:t>
             </a:r>
             <a:r>
-              <a:rPr lang="en-GB" sz="1400" dirty="0">
+              <a:rPr lang="en-GB" sz="1200" dirty="0">
                 <a:solidFill>
                   <a:srgbClr val="000000"/>
                 </a:solidFill>
@@ -7170,7 +7378,7 @@
               <a:t> = </a:t>
             </a:r>
             <a:r>
-              <a:rPr lang="en-GB" sz="1400" dirty="0">
+              <a:rPr lang="en-GB" sz="1200" dirty="0">
                 <a:solidFill>
                   <a:srgbClr val="0000FF"/>
                 </a:solidFill>
@@ -7179,7 +7387,7 @@
               <a:t>true</a:t>
             </a:r>
             <a:r>
-              <a:rPr lang="en-GB" sz="1400" dirty="0">
+              <a:rPr lang="en-GB" sz="1200" dirty="0">
                 <a:solidFill>
                   <a:srgbClr val="000000"/>
                 </a:solidFill>
@@ -7190,7 +7398,7 @@
           </a:p>
           <a:p>
             <a:r>
-              <a:rPr lang="en-US" sz="1400" dirty="0">
+              <a:rPr lang="en-US" sz="1200" dirty="0">
                 <a:solidFill>
                   <a:srgbClr val="0000FF"/>
                 </a:solidFill>
@@ -7199,7 +7407,7 @@
               <a:t>public</a:t>
             </a:r>
             <a:r>
-              <a:rPr lang="en-US" sz="1400" dirty="0">
+              <a:rPr lang="en-US" sz="1200" dirty="0">
                 <a:solidFill>
                   <a:srgbClr val="000000"/>
                 </a:solidFill>
@@ -7208,7 +7416,7 @@
               <a:t> </a:t>
             </a:r>
             <a:r>
-              <a:rPr lang="en-US" sz="1400" dirty="0">
+              <a:rPr lang="en-US" sz="1200" dirty="0">
                 <a:solidFill>
                   <a:srgbClr val="0000FF"/>
                 </a:solidFill>
@@ -7217,7 +7425,7 @@
               <a:t>class</a:t>
             </a:r>
             <a:r>
-              <a:rPr lang="en-US" sz="1400" dirty="0">
+              <a:rPr lang="en-US" sz="1200" dirty="0">
                 <a:solidFill>
                   <a:srgbClr val="000000"/>
                 </a:solidFill>
@@ -7226,7 +7434,7 @@
               <a:t> </a:t>
             </a:r>
             <a:r>
-              <a:rPr lang="en-US" sz="1400" dirty="0" err="1">
+              <a:rPr lang="en-US" sz="1200" dirty="0" err="1">
                 <a:solidFill>
                   <a:srgbClr val="2B91AF"/>
                 </a:solidFill>
@@ -7235,7 +7443,7 @@
               <a:t>AiHandleErrorAttribute</a:t>
             </a:r>
             <a:r>
-              <a:rPr lang="en-US" sz="1400" dirty="0">
+              <a:rPr lang="en-US" sz="1200" dirty="0">
                 <a:solidFill>
                   <a:srgbClr val="000000"/>
                 </a:solidFill>
@@ -7244,7 +7452,7 @@
               <a:t> : </a:t>
             </a:r>
             <a:r>
-              <a:rPr lang="en-US" sz="1400" dirty="0" err="1">
+              <a:rPr lang="en-US" sz="1200" dirty="0" err="1">
                 <a:solidFill>
                   <a:srgbClr val="2B91AF"/>
                 </a:solidFill>
@@ -7252,7 +7460,7 @@
               </a:rPr>
               <a:t>HandleErrorAttribute</a:t>
             </a:r>
-            <a:endParaRPr lang="en-US" sz="1400" dirty="0">
+            <a:endParaRPr lang="en-US" sz="1200" dirty="0">
               <a:solidFill>
                 <a:srgbClr val="000000"/>
               </a:solidFill>
@@ -7261,7 +7469,7 @@
           </a:p>
           <a:p>
             <a:r>
-              <a:rPr lang="en-US" sz="1400" dirty="0">
+              <a:rPr lang="en-US" sz="1200" dirty="0">
                 <a:solidFill>
                   <a:srgbClr val="000000"/>
                 </a:solidFill>
@@ -7272,7 +7480,7 @@
           </a:p>
           <a:p>
             <a:r>
-              <a:rPr lang="fr-FR" sz="1400" dirty="0">
+              <a:rPr lang="fr-FR" sz="1200" dirty="0">
                 <a:solidFill>
                   <a:srgbClr val="000000"/>
                 </a:solidFill>
@@ -7281,7 +7489,7 @@
               <a:t>    </a:t>
             </a:r>
             <a:r>
-              <a:rPr lang="fr-FR" sz="1400" dirty="0">
+              <a:rPr lang="fr-FR" sz="1200" dirty="0">
                 <a:solidFill>
                   <a:srgbClr val="0000FF"/>
                 </a:solidFill>
@@ -7290,7 +7498,7 @@
               <a:t>public</a:t>
             </a:r>
             <a:r>
-              <a:rPr lang="fr-FR" sz="1400" dirty="0">
+              <a:rPr lang="fr-FR" sz="1200" dirty="0">
                 <a:solidFill>
                   <a:srgbClr val="000000"/>
                 </a:solidFill>
@@ -7299,7 +7507,7 @@
               <a:t> </a:t>
             </a:r>
             <a:r>
-              <a:rPr lang="fr-FR" sz="1400" dirty="0" err="1">
+              <a:rPr lang="fr-FR" sz="1200" dirty="0" err="1">
                 <a:solidFill>
                   <a:srgbClr val="0000FF"/>
                 </a:solidFill>
@@ -7308,7 +7516,7 @@
               <a:t>override</a:t>
             </a:r>
             <a:r>
-              <a:rPr lang="fr-FR" sz="1400" dirty="0">
+              <a:rPr lang="fr-FR" sz="1200" dirty="0">
                 <a:solidFill>
                   <a:srgbClr val="000000"/>
                 </a:solidFill>
@@ -7317,7 +7525,7 @@
               <a:t> </a:t>
             </a:r>
             <a:r>
-              <a:rPr lang="fr-FR" sz="1400" dirty="0" err="1">
+              <a:rPr lang="fr-FR" sz="1200" dirty="0" err="1">
                 <a:solidFill>
                   <a:srgbClr val="0000FF"/>
                 </a:solidFill>
@@ -7326,7 +7534,7 @@
               <a:t>void</a:t>
             </a:r>
             <a:r>
-              <a:rPr lang="fr-FR" sz="1400" dirty="0">
+              <a:rPr lang="fr-FR" sz="1200" dirty="0">
                 <a:solidFill>
                   <a:srgbClr val="000000"/>
                 </a:solidFill>
@@ -7335,7 +7543,7 @@
               <a:t> </a:t>
             </a:r>
             <a:r>
-              <a:rPr lang="fr-FR" sz="1400" dirty="0" err="1">
+              <a:rPr lang="fr-FR" sz="1200" dirty="0" err="1">
                 <a:solidFill>
                   <a:srgbClr val="000000"/>
                 </a:solidFill>
@@ -7344,7 +7552,7 @@
               <a:t>OnException</a:t>
             </a:r>
             <a:r>
-              <a:rPr lang="fr-FR" sz="1400" dirty="0">
+              <a:rPr lang="fr-FR" sz="1200" dirty="0">
                 <a:solidFill>
                   <a:srgbClr val="000000"/>
                 </a:solidFill>
@@ -7353,7 +7561,7 @@
               <a:t>(</a:t>
             </a:r>
             <a:r>
-              <a:rPr lang="fr-FR" sz="1400" dirty="0" err="1">
+              <a:rPr lang="fr-FR" sz="1200" dirty="0" err="1">
                 <a:solidFill>
                   <a:srgbClr val="2B91AF"/>
                 </a:solidFill>
@@ -7362,7 +7570,7 @@
               <a:t>ExceptionContext</a:t>
             </a:r>
             <a:r>
-              <a:rPr lang="fr-FR" sz="1400" dirty="0">
+              <a:rPr lang="fr-FR" sz="1200" dirty="0">
                 <a:solidFill>
                   <a:srgbClr val="000000"/>
                 </a:solidFill>
@@ -7371,7 +7579,7 @@
               <a:t> </a:t>
             </a:r>
             <a:r>
-              <a:rPr lang="fr-FR" sz="1400" dirty="0" err="1">
+              <a:rPr lang="fr-FR" sz="1200" dirty="0" err="1">
                 <a:solidFill>
                   <a:srgbClr val="000000"/>
                 </a:solidFill>
@@ -7380,7 +7588,7 @@
               <a:t>filterContext</a:t>
             </a:r>
             <a:r>
-              <a:rPr lang="fr-FR" sz="1400" dirty="0">
+              <a:rPr lang="fr-FR" sz="1200" dirty="0">
                 <a:solidFill>
                   <a:srgbClr val="000000"/>
                 </a:solidFill>
@@ -7391,7 +7599,7 @@
           </a:p>
           <a:p>
             <a:r>
-              <a:rPr lang="en-US" sz="1400" dirty="0">
+              <a:rPr lang="en-US" sz="1200" dirty="0">
                 <a:solidFill>
                   <a:srgbClr val="000000"/>
                 </a:solidFill>
@@ -7402,7 +7610,7 @@
           </a:p>
           <a:p>
             <a:r>
-              <a:rPr lang="en-US" sz="1400" dirty="0">
+              <a:rPr lang="en-US" sz="1200" dirty="0">
                 <a:solidFill>
                   <a:srgbClr val="000000"/>
                 </a:solidFill>
@@ -7411,7 +7619,7 @@
               <a:t>        </a:t>
             </a:r>
             <a:r>
-              <a:rPr lang="en-US" sz="1400" dirty="0">
+              <a:rPr lang="en-US" sz="1200" dirty="0">
                 <a:solidFill>
                   <a:srgbClr val="0000FF"/>
                 </a:solidFill>
@@ -7420,7 +7628,7 @@
               <a:t>if</a:t>
             </a:r>
             <a:r>
-              <a:rPr lang="en-US" sz="1400" dirty="0">
+              <a:rPr lang="en-US" sz="1200" dirty="0">
                 <a:solidFill>
                   <a:srgbClr val="000000"/>
                 </a:solidFill>
@@ -7429,7 +7637,7 @@
               <a:t> (</a:t>
             </a:r>
             <a:r>
-              <a:rPr lang="en-US" sz="1400" dirty="0" err="1">
+              <a:rPr lang="en-US" sz="1200" dirty="0" err="1">
                 <a:solidFill>
                   <a:srgbClr val="000000"/>
                 </a:solidFill>
@@ -7438,7 +7646,7 @@
               <a:t>filterContext</a:t>
             </a:r>
             <a:r>
-              <a:rPr lang="en-US" sz="1400" dirty="0">
+              <a:rPr lang="en-US" sz="1200" dirty="0">
                 <a:solidFill>
                   <a:srgbClr val="000000"/>
                 </a:solidFill>
@@ -7447,7 +7655,7 @@
               <a:t> != </a:t>
             </a:r>
             <a:r>
-              <a:rPr lang="en-US" sz="1400" dirty="0">
+              <a:rPr lang="en-US" sz="1200" dirty="0">
                 <a:solidFill>
                   <a:srgbClr val="0000FF"/>
                 </a:solidFill>
@@ -7456,7 +7664,7 @@
               <a:t>null</a:t>
             </a:r>
             <a:r>
-              <a:rPr lang="en-US" sz="1400" dirty="0">
+              <a:rPr lang="en-US" sz="1200" dirty="0">
                 <a:solidFill>
                   <a:srgbClr val="000000"/>
                 </a:solidFill>
@@ -7465,7 +7673,7 @@
               <a:t> &amp;&amp; </a:t>
             </a:r>
             <a:r>
-              <a:rPr lang="en-US" sz="1400" dirty="0" err="1">
+              <a:rPr lang="en-US" sz="1200" dirty="0" err="1">
                 <a:solidFill>
                   <a:srgbClr val="000000"/>
                 </a:solidFill>
@@ -7474,7 +7682,7 @@
               <a:t>filterContext.HttpContext</a:t>
             </a:r>
             <a:r>
-              <a:rPr lang="en-US" sz="1400" dirty="0">
+              <a:rPr lang="en-US" sz="1200" dirty="0">
                 <a:solidFill>
                   <a:srgbClr val="000000"/>
                 </a:solidFill>
@@ -7483,7 +7691,7 @@
               <a:t> != </a:t>
             </a:r>
             <a:r>
-              <a:rPr lang="en-US" sz="1400" dirty="0">
+              <a:rPr lang="en-US" sz="1200" dirty="0">
                 <a:solidFill>
                   <a:srgbClr val="0000FF"/>
                 </a:solidFill>
@@ -7492,7 +7700,7 @@
               <a:t>null</a:t>
             </a:r>
             <a:r>
-              <a:rPr lang="en-US" sz="1400" dirty="0">
+              <a:rPr lang="en-US" sz="1200" dirty="0">
                 <a:solidFill>
                   <a:srgbClr val="000000"/>
                 </a:solidFill>
@@ -7501,7 +7709,7 @@
               <a:t> &amp;&amp; </a:t>
             </a:r>
             <a:r>
-              <a:rPr lang="en-US" sz="1400" dirty="0" err="1">
+              <a:rPr lang="en-US" sz="1200" dirty="0" err="1">
                 <a:solidFill>
                   <a:srgbClr val="000000"/>
                 </a:solidFill>
@@ -7510,7 +7718,7 @@
               <a:t>filterContext.Exception</a:t>
             </a:r>
             <a:r>
-              <a:rPr lang="en-US" sz="1400" dirty="0">
+              <a:rPr lang="en-US" sz="1200" dirty="0">
                 <a:solidFill>
                   <a:srgbClr val="000000"/>
                 </a:solidFill>
@@ -7519,7 +7727,7 @@
               <a:t> != </a:t>
             </a:r>
             <a:r>
-              <a:rPr lang="en-US" sz="1400" dirty="0">
+              <a:rPr lang="en-US" sz="1200" dirty="0">
                 <a:solidFill>
                   <a:srgbClr val="0000FF"/>
                 </a:solidFill>
@@ -7528,7 +7736,7 @@
               <a:t>null</a:t>
             </a:r>
             <a:r>
-              <a:rPr lang="en-US" sz="1400" dirty="0">
+              <a:rPr lang="en-US" sz="1200" dirty="0">
                 <a:solidFill>
                   <a:srgbClr val="000000"/>
                 </a:solidFill>
@@ -7539,7 +7747,7 @@
           </a:p>
           <a:p>
             <a:r>
-              <a:rPr lang="en-US" sz="1400" dirty="0">
+              <a:rPr lang="en-US" sz="1200" dirty="0">
                 <a:solidFill>
                   <a:srgbClr val="000000"/>
                 </a:solidFill>
@@ -7547,7 +7755,7 @@
               </a:rPr>
               <a:t>        {</a:t>
             </a:r>
-            <a:endParaRPr lang="en-GB" sz="1400" dirty="0">
+            <a:endParaRPr lang="en-GB" sz="1200" dirty="0">
               <a:solidFill>
                 <a:srgbClr val="000000"/>
               </a:solidFill>
@@ -7556,7 +7764,7 @@
           </a:p>
           <a:p>
             <a:r>
-              <a:rPr lang="en-US" sz="1400" dirty="0">
+              <a:rPr lang="en-US" sz="1200" dirty="0">
                 <a:solidFill>
                   <a:srgbClr val="000000"/>
                 </a:solidFill>
@@ -7565,7 +7773,7 @@
               <a:t>            </a:t>
             </a:r>
             <a:r>
-              <a:rPr lang="en-US" sz="1400" dirty="0">
+              <a:rPr lang="en-US" sz="1200" dirty="0">
                 <a:solidFill>
                   <a:srgbClr val="0000FF"/>
                 </a:solidFill>
@@ -7574,7 +7782,7 @@
               <a:t>if</a:t>
             </a:r>
             <a:r>
-              <a:rPr lang="en-US" sz="1400" dirty="0">
+              <a:rPr lang="en-US" sz="1200" dirty="0">
                 <a:solidFill>
                   <a:srgbClr val="000000"/>
                 </a:solidFill>
@@ -7583,7 +7791,7 @@
               <a:t> (</a:t>
             </a:r>
             <a:r>
-              <a:rPr lang="en-US" sz="1400" dirty="0" err="1">
+              <a:rPr lang="en-US" sz="1200" dirty="0" err="1">
                 <a:solidFill>
                   <a:srgbClr val="000000"/>
                 </a:solidFill>
@@ -7592,7 +7800,7 @@
               <a:t>filterContext.HttpContext.IsCustomErrorEnabled</a:t>
             </a:r>
             <a:r>
-              <a:rPr lang="en-US" sz="1400" dirty="0">
+              <a:rPr lang="en-US" sz="1200" dirty="0">
                 <a:solidFill>
                   <a:srgbClr val="000000"/>
                 </a:solidFill>
@@ -7603,7 +7811,7 @@
           </a:p>
           <a:p>
             <a:r>
-              <a:rPr lang="en-US" sz="1400" dirty="0">
+              <a:rPr lang="en-US" sz="1200" dirty="0">
                 <a:solidFill>
                   <a:srgbClr val="000000"/>
                 </a:solidFill>
@@ -7611,7 +7819,7 @@
               </a:rPr>
               <a:t>            {</a:t>
             </a:r>
-            <a:endParaRPr lang="en-GB" sz="1400" dirty="0">
+            <a:endParaRPr lang="en-GB" sz="1200" dirty="0">
               <a:solidFill>
                 <a:srgbClr val="000000"/>
               </a:solidFill>
@@ -7620,7 +7828,7 @@
           </a:p>
           <a:p>
             <a:r>
-              <a:rPr lang="en-US" sz="1400" dirty="0">
+              <a:rPr lang="en-US" sz="1200" dirty="0">
                 <a:solidFill>
                   <a:srgbClr val="000000"/>
                 </a:solidFill>
@@ -7629,7 +7837,7 @@
               <a:t>                </a:t>
             </a:r>
             <a:r>
-              <a:rPr lang="en-US" sz="1400" dirty="0" err="1">
+              <a:rPr lang="en-US" sz="1200" dirty="0" err="1">
                 <a:solidFill>
                   <a:srgbClr val="0000FF"/>
                 </a:solidFill>
@@ -7638,7 +7846,7 @@
               <a:t>var</a:t>
             </a:r>
             <a:r>
-              <a:rPr lang="en-US" sz="1400" dirty="0">
+              <a:rPr lang="en-US" sz="1200" dirty="0">
                 <a:solidFill>
                   <a:srgbClr val="000000"/>
                 </a:solidFill>
@@ -7647,7 +7855,7 @@
               <a:t> </a:t>
             </a:r>
             <a:r>
-              <a:rPr lang="en-US" sz="1400" dirty="0" err="1">
+              <a:rPr lang="en-US" sz="1200" dirty="0" err="1">
                 <a:solidFill>
                   <a:srgbClr val="000000"/>
                 </a:solidFill>
@@ -7656,7 +7864,7 @@
               <a:t>ai</a:t>
             </a:r>
             <a:r>
-              <a:rPr lang="en-US" sz="1400" dirty="0">
+              <a:rPr lang="en-US" sz="1200" dirty="0">
                 <a:solidFill>
                   <a:srgbClr val="000000"/>
                 </a:solidFill>
@@ -7665,7 +7873,7 @@
               <a:t> = </a:t>
             </a:r>
             <a:r>
-              <a:rPr lang="en-US" sz="1400" dirty="0">
+              <a:rPr lang="en-US" sz="1200" dirty="0">
                 <a:solidFill>
                   <a:srgbClr val="0000FF"/>
                 </a:solidFill>
@@ -7674,7 +7882,7 @@
               <a:t>new</a:t>
             </a:r>
             <a:r>
-              <a:rPr lang="en-US" sz="1400" dirty="0">
+              <a:rPr lang="en-US" sz="1200" dirty="0">
                 <a:solidFill>
                   <a:srgbClr val="000000"/>
                 </a:solidFill>
@@ -7683,7 +7891,7 @@
               <a:t> </a:t>
             </a:r>
             <a:r>
-              <a:rPr lang="en-US" sz="1400" dirty="0" err="1">
+              <a:rPr lang="en-US" sz="1200" dirty="0" err="1">
                 <a:solidFill>
                   <a:srgbClr val="2B91AF"/>
                 </a:solidFill>
@@ -7692,7 +7900,7 @@
               <a:t>TelemetryClient</a:t>
             </a:r>
             <a:r>
-              <a:rPr lang="en-US" sz="1400" dirty="0">
+              <a:rPr lang="en-US" sz="1200" dirty="0">
                 <a:solidFill>
                   <a:srgbClr val="000000"/>
                 </a:solidFill>
@@ -7703,7 +7911,7 @@
           </a:p>
           <a:p>
             <a:r>
-              <a:rPr lang="en-GB" sz="1400" dirty="0">
+              <a:rPr lang="en-GB" sz="1200" dirty="0">
                 <a:solidFill>
                   <a:srgbClr val="000000"/>
                 </a:solidFill>
@@ -7712,7 +7920,7 @@
               <a:t>                </a:t>
             </a:r>
             <a:r>
-              <a:rPr lang="en-GB" sz="1400" dirty="0">
+              <a:rPr lang="en-GB" sz="1200" dirty="0">
                 <a:solidFill>
                   <a:srgbClr val="008000"/>
                 </a:solidFill>
@@ -7721,7 +7929,7 @@
               <a:t>//</a:t>
             </a:r>
             <a:r>
-              <a:rPr lang="en-GB" sz="1400" dirty="0" err="1">
+              <a:rPr lang="en-GB" sz="1200" dirty="0" err="1">
                 <a:solidFill>
                   <a:srgbClr val="008000"/>
                 </a:solidFill>
@@ -7730,7 +7938,7 @@
               <a:t>ai.InstrumentationKey</a:t>
             </a:r>
             <a:r>
-              <a:rPr lang="en-GB" sz="1400" dirty="0">
+              <a:rPr lang="en-GB" sz="1200" dirty="0">
                 <a:solidFill>
                   <a:srgbClr val="008000"/>
                 </a:solidFill>
@@ -7739,7 +7947,7 @@
               <a:t> = ""; //configured this globally in </a:t>
             </a:r>
             <a:r>
-              <a:rPr lang="en-GB" sz="1400" dirty="0" err="1">
+              <a:rPr lang="en-GB" sz="1200" dirty="0" err="1">
                 <a:solidFill>
                   <a:srgbClr val="008000"/>
                 </a:solidFill>
@@ -7747,7 +7955,7 @@
               </a:rPr>
               <a:t>Application_Start</a:t>
             </a:r>
-            <a:endParaRPr lang="en-GB" sz="1400" dirty="0">
+            <a:endParaRPr lang="en-GB" sz="1200" dirty="0">
               <a:solidFill>
                 <a:srgbClr val="000000"/>
               </a:solidFill>
@@ -7756,7 +7964,7 @@
           </a:p>
           <a:p>
             <a:r>
-              <a:rPr lang="en-US" sz="1400" dirty="0">
+              <a:rPr lang="en-US" sz="1200" dirty="0">
                 <a:solidFill>
                   <a:srgbClr val="000000"/>
                 </a:solidFill>
@@ -7765,7 +7973,7 @@
               <a:t>                </a:t>
             </a:r>
             <a:r>
-              <a:rPr lang="en-US" sz="1400" dirty="0" err="1">
+              <a:rPr lang="en-US" sz="1200" dirty="0" err="1">
                 <a:solidFill>
                   <a:srgbClr val="000000"/>
                 </a:solidFill>
@@ -7774,7 +7982,7 @@
               <a:t>ai.TrackException</a:t>
             </a:r>
             <a:r>
-              <a:rPr lang="en-US" sz="1400" dirty="0">
+              <a:rPr lang="en-US" sz="1200" dirty="0">
                 <a:solidFill>
                   <a:srgbClr val="000000"/>
                 </a:solidFill>
@@ -7783,7 +7991,7 @@
               <a:t>(</a:t>
             </a:r>
             <a:r>
-              <a:rPr lang="en-US" sz="1400" dirty="0" err="1">
+              <a:rPr lang="en-US" sz="1200" dirty="0" err="1">
                 <a:solidFill>
                   <a:srgbClr val="000000"/>
                 </a:solidFill>
@@ -7792,7 +8000,7 @@
               <a:t>filterContext.Exception</a:t>
             </a:r>
             <a:r>
-              <a:rPr lang="en-US" sz="1400" dirty="0">
+              <a:rPr lang="en-US" sz="1200" dirty="0">
                 <a:solidFill>
                   <a:srgbClr val="000000"/>
                 </a:solidFill>
@@ -7803,7 +8011,7 @@
           </a:p>
           <a:p>
             <a:r>
-              <a:rPr lang="en-US" sz="1400" dirty="0">
+              <a:rPr lang="en-US" sz="1200" dirty="0">
                 <a:solidFill>
                   <a:srgbClr val="000000"/>
                 </a:solidFill>
@@ -7814,7 +8022,7 @@
           </a:p>
           <a:p>
             <a:r>
-              <a:rPr lang="en-US" sz="1400" dirty="0">
+              <a:rPr lang="en-US" sz="1200" dirty="0">
                 <a:solidFill>
                   <a:srgbClr val="000000"/>
                 </a:solidFill>
@@ -7825,7 +8033,7 @@
           </a:p>
           <a:p>
             <a:r>
-              <a:rPr lang="en-US" sz="1400" dirty="0">
+              <a:rPr lang="en-US" sz="1200" dirty="0">
                 <a:solidFill>
                   <a:srgbClr val="000000"/>
                 </a:solidFill>
@@ -7834,7 +8042,7 @@
               <a:t>        </a:t>
             </a:r>
             <a:r>
-              <a:rPr lang="en-US" sz="1400" dirty="0" err="1">
+              <a:rPr lang="en-US" sz="1200" dirty="0" err="1">
                 <a:solidFill>
                   <a:srgbClr val="0000FF"/>
                 </a:solidFill>
@@ -7843,7 +8051,7 @@
               <a:t>base</a:t>
             </a:r>
             <a:r>
-              <a:rPr lang="en-US" sz="1400" dirty="0" err="1">
+              <a:rPr lang="en-US" sz="1200" dirty="0" err="1">
                 <a:solidFill>
                   <a:srgbClr val="000000"/>
                 </a:solidFill>
@@ -7852,7 +8060,7 @@
               <a:t>.OnException</a:t>
             </a:r>
             <a:r>
-              <a:rPr lang="en-US" sz="1400" dirty="0">
+              <a:rPr lang="en-US" sz="1200" dirty="0">
                 <a:solidFill>
                   <a:srgbClr val="000000"/>
                 </a:solidFill>
@@ -7861,7 +8069,7 @@
               <a:t>(</a:t>
             </a:r>
             <a:r>
-              <a:rPr lang="en-US" sz="1400" dirty="0" err="1">
+              <a:rPr lang="en-US" sz="1200" dirty="0" err="1">
                 <a:solidFill>
                   <a:srgbClr val="000000"/>
                 </a:solidFill>
@@ -7870,7 +8078,7 @@
               <a:t>filterContext</a:t>
             </a:r>
             <a:r>
-              <a:rPr lang="en-US" sz="1400" dirty="0">
+              <a:rPr lang="en-US" sz="1200" dirty="0">
                 <a:solidFill>
                   <a:srgbClr val="000000"/>
                 </a:solidFill>
@@ -7881,7 +8089,7 @@
           </a:p>
           <a:p>
             <a:r>
-              <a:rPr lang="en-US" sz="1400" dirty="0">
+              <a:rPr lang="en-US" sz="1200" dirty="0">
                 <a:solidFill>
                   <a:srgbClr val="000000"/>
                 </a:solidFill>
@@ -7892,7 +8100,7 @@
           </a:p>
           <a:p>
             <a:r>
-              <a:rPr lang="en-US" sz="1400" dirty="0">
+              <a:rPr lang="en-US" sz="1200" dirty="0">
                 <a:solidFill>
                   <a:srgbClr val="000000"/>
                 </a:solidFill>
@@ -7900,7 +8108,7 @@
               </a:rPr>
               <a:t>}</a:t>
             </a:r>
-            <a:endParaRPr lang="en-US" sz="1400" dirty="0"/>
+            <a:endParaRPr lang="en-US" sz="1200" dirty="0"/>
           </a:p>
         </p:txBody>
       </p:sp>
@@ -7929,16 +8137,32 @@
               <a:buAutoNum type="arabicPeriod"/>
             </a:pPr>
             <a:r>
-              <a:rPr lang="en-US" sz="2000" dirty="0"/>
+              <a:rPr lang="en-US" sz="2000" dirty="0">
+                <a:solidFill>
+                  <a:schemeClr val="bg1">
+                    <a:lumMod val="50000"/>
+                  </a:schemeClr>
+                </a:solidFill>
+              </a:rPr>
               <a:t>Install NuGet package: </a:t>
             </a:r>
             <a:r>
               <a:rPr lang="en-US" sz="2000" dirty="0" err="1">
+                <a:solidFill>
+                  <a:schemeClr val="bg1">
+                    <a:lumMod val="50000"/>
+                  </a:schemeClr>
+                </a:solidFill>
                 <a:latin typeface="Consolas" panose="020B0609020204030204" pitchFamily="49" charset="0"/>
               </a:rPr>
               <a:t>Microsoft.ApplicationInsights.Web</a:t>
             </a:r>
             <a:endParaRPr lang="en-US" sz="2000" dirty="0">
+              <a:solidFill>
+                <a:schemeClr val="bg1">
+                  <a:lumMod val="50000"/>
+                </a:schemeClr>
+              </a:solidFill>
               <a:latin typeface="Consolas" panose="020B0609020204030204" pitchFamily="49" charset="0"/>
             </a:endParaRPr>
           </a:p>
@@ -7947,7 +8171,13 @@
               <a:buAutoNum type="arabicPeriod"/>
             </a:pPr>
             <a:r>
-              <a:rPr lang="en-US" sz="2000" dirty="0"/>
+              <a:rPr lang="en-US" sz="2000" dirty="0">
+                <a:solidFill>
+                  <a:schemeClr val="bg1">
+                    <a:lumMod val="50000"/>
+                  </a:schemeClr>
+                </a:solidFill>
+              </a:rPr>
               <a:t>Use below code to track application exceptions</a:t>
             </a:r>
           </a:p>
@@ -9442,7 +9672,7 @@
               <a:t>        </a:t>
             </a:r>
             <a:r>
-              <a:rPr lang="en-US" sz="1200" b="1" dirty="0" err="1">
+              <a:rPr lang="en-US" sz="1200" dirty="0" err="1">
                 <a:solidFill>
                   <a:srgbClr val="000000"/>
                 </a:solidFill>
@@ -9458,7 +9688,7 @@
               <a:t>instrumentationKey</a:t>
             </a:r>
             <a:r>
-              <a:rPr lang="en-US" sz="1200" b="1" dirty="0">
+              <a:rPr lang="en-US" sz="1200" dirty="0">
                 <a:solidFill>
                   <a:srgbClr val="000000"/>
                 </a:solidFill>
@@ -9474,7 +9704,7 @@
               <a:t>: </a:t>
             </a:r>
             <a:r>
-              <a:rPr lang="en-US" sz="1200" b="1" dirty="0">
+              <a:rPr lang="en-US" sz="1200" dirty="0">
                 <a:solidFill>
                   <a:srgbClr val="A31515"/>
                 </a:solidFill>
@@ -9490,7 +9720,7 @@
               <a:t>"</a:t>
             </a:r>
             <a:r>
-              <a:rPr lang="en-US" sz="1200" b="1" dirty="0">
+              <a:rPr lang="en-US" sz="1200" dirty="0">
                 <a:solidFill>
                   <a:srgbClr val="000000"/>
                 </a:solidFill>
@@ -9506,7 +9736,7 @@
               <a:t>@Microsoft.ApplicationInsights.Extensibility.</a:t>
             </a:r>
             <a:r>
-              <a:rPr lang="en-US" sz="1200" b="1" dirty="0">
+              <a:rPr lang="en-US" sz="1200" dirty="0">
                 <a:solidFill>
                   <a:srgbClr val="2B91AF"/>
                 </a:solidFill>
@@ -9522,7 +9752,7 @@
               <a:t>TelemetryConfiguration</a:t>
             </a:r>
             <a:r>
-              <a:rPr lang="en-US" sz="1200" b="1" dirty="0">
+              <a:rPr lang="en-US" sz="1200" dirty="0">
                 <a:solidFill>
                   <a:srgbClr val="000000"/>
                 </a:solidFill>
@@ -9538,7 +9768,7 @@
               <a:t>.Active.InstrumentationKey</a:t>
             </a:r>
             <a:r>
-              <a:rPr lang="en-US" sz="1200" b="1" dirty="0">
+              <a:rPr lang="en-US" sz="1200" dirty="0">
                 <a:solidFill>
                   <a:srgbClr val="A31515"/>
                 </a:solidFill>
@@ -9553,7 +9783,7 @@
               </a:rPr>
               <a:t>"</a:t>
             </a:r>
-            <a:endParaRPr lang="en-US" sz="1200" b="1" dirty="0">
+            <a:endParaRPr lang="en-US" sz="1200" dirty="0">
               <a:solidFill>
                 <a:srgbClr val="000000"/>
               </a:solidFill>
@@ -9986,7 +10216,13 @@
               <a:buAutoNum type="arabicPeriod"/>
             </a:pPr>
             <a:r>
-              <a:rPr lang="en-US" sz="2000" dirty="0"/>
+              <a:rPr lang="en-US" sz="2000" dirty="0">
+                <a:solidFill>
+                  <a:schemeClr val="bg1">
+                    <a:lumMod val="50000"/>
+                  </a:schemeClr>
+                </a:solidFill>
+              </a:rPr>
               <a:t>Code to track page views and dependency</a:t>
             </a:r>
           </a:p>
@@ -10014,31 +10250,73 @@
           <a:lstStyle/>
           <a:p>
             <a:r>
-              <a:rPr lang="en-US" sz="2000" dirty="0"/>
+              <a:rPr lang="en-US" sz="2000" dirty="0">
+                <a:solidFill>
+                  <a:schemeClr val="bg1">
+                    <a:lumMod val="50000"/>
+                  </a:schemeClr>
+                </a:solidFill>
+              </a:rPr>
               <a:t>2.  Use below code in </a:t>
             </a:r>
             <a:r>
-              <a:rPr lang="en-US" sz="2000" dirty="0" err="1"/>
+              <a:rPr lang="en-US" sz="2000" dirty="0" err="1">
+                <a:solidFill>
+                  <a:schemeClr val="bg1">
+                    <a:lumMod val="50000"/>
+                  </a:schemeClr>
+                </a:solidFill>
+              </a:rPr>
               <a:t>web.config</a:t>
             </a:r>
             <a:r>
-              <a:rPr lang="en-US" sz="2000" dirty="0"/>
+              <a:rPr lang="en-US" sz="2000" dirty="0">
+                <a:solidFill>
+                  <a:schemeClr val="bg1">
+                    <a:lumMod val="50000"/>
+                  </a:schemeClr>
+                </a:solidFill>
+              </a:rPr>
               <a:t> and </a:t>
             </a:r>
             <a:r>
-              <a:rPr lang="en-US" sz="2000" dirty="0" err="1"/>
+              <a:rPr lang="en-US" sz="2000" dirty="0" err="1">
+                <a:solidFill>
+                  <a:schemeClr val="bg1">
+                    <a:lumMod val="50000"/>
+                  </a:schemeClr>
+                </a:solidFill>
+              </a:rPr>
               <a:t>Global.asax</a:t>
             </a:r>
             <a:r>
-              <a:rPr lang="en-US" sz="2000" dirty="0"/>
+              <a:rPr lang="en-US" sz="2000" dirty="0">
+                <a:solidFill>
+                  <a:schemeClr val="bg1">
+                    <a:lumMod val="50000"/>
+                  </a:schemeClr>
+                </a:solidFill>
+              </a:rPr>
               <a:t> | </a:t>
             </a:r>
             <a:r>
-              <a:rPr lang="en-US" sz="2000" dirty="0" err="1"/>
+              <a:rPr lang="en-US" sz="2000" dirty="0" err="1">
+                <a:solidFill>
+                  <a:schemeClr val="bg1">
+                    <a:lumMod val="50000"/>
+                  </a:schemeClr>
+                </a:solidFill>
+              </a:rPr>
               <a:t>Application_Start</a:t>
             </a:r>
             <a:r>
-              <a:rPr lang="en-US" sz="2000" dirty="0"/>
+              <a:rPr lang="en-US" sz="2000" dirty="0">
+                <a:solidFill>
+                  <a:schemeClr val="bg1">
+                    <a:lumMod val="50000"/>
+                  </a:schemeClr>
+                </a:solidFill>
+              </a:rPr>
               <a:t>()</a:t>
             </a:r>
           </a:p>
@@ -10320,7 +10598,9 @@
             <a:r>
               <a:rPr lang="en-US" sz="2000" dirty="0">
                 <a:solidFill>
-                  <a:srgbClr val="505050"/>
+                  <a:schemeClr val="bg1">
+                    <a:lumMod val="50000"/>
+                  </a:schemeClr>
                 </a:solidFill>
                 <a:latin typeface="Segoe UI" panose="020B0502040204020203" pitchFamily="34" charset="0"/>
               </a:rPr>
@@ -10329,7 +10609,9 @@
             <a:r>
               <a:rPr lang="en-US" sz="1400" dirty="0">
                 <a:solidFill>
-                  <a:srgbClr val="505050"/>
+                  <a:schemeClr val="bg1">
+                    <a:lumMod val="50000"/>
+                  </a:schemeClr>
                 </a:solidFill>
                 <a:latin typeface="Segoe UI" panose="020B0502040204020203" pitchFamily="34" charset="0"/>
               </a:rPr>
@@ -10337,7 +10619,9 @@
             </a:r>
             <a:endParaRPr lang="en-US" sz="2000" dirty="0">
               <a:solidFill>
-                <a:srgbClr val="505050"/>
+                <a:schemeClr val="bg1">
+                  <a:lumMod val="50000"/>
+                </a:schemeClr>
               </a:solidFill>
               <a:latin typeface="Segoe UI" panose="020B0502040204020203" pitchFamily="34" charset="0"/>
             </a:endParaRPr>
@@ -10350,7 +10634,9 @@
             </a:pPr>
             <a:endParaRPr lang="en-US" sz="2000" dirty="0">
               <a:solidFill>
-                <a:srgbClr val="505050"/>
+                <a:schemeClr val="bg1">
+                  <a:lumMod val="50000"/>
+                </a:schemeClr>
               </a:solidFill>
               <a:latin typeface="Segoe UI" panose="020B0502040204020203" pitchFamily="34" charset="0"/>
             </a:endParaRPr>
@@ -10364,7 +10650,9 @@
             <a:r>
               <a:rPr lang="en-US" sz="2000" dirty="0">
                 <a:solidFill>
-                  <a:srgbClr val="505050"/>
+                  <a:schemeClr val="bg1">
+                    <a:lumMod val="50000"/>
+                  </a:schemeClr>
                 </a:solidFill>
                 <a:latin typeface="Segoe UI" panose="020B0502040204020203" pitchFamily="34" charset="0"/>
               </a:rPr>
@@ -10373,7 +10661,9 @@
             <a:r>
               <a:rPr lang="en-US" sz="1400" dirty="0">
                 <a:solidFill>
-                  <a:srgbClr val="505050"/>
+                  <a:schemeClr val="bg1">
+                    <a:lumMod val="50000"/>
+                  </a:schemeClr>
                 </a:solidFill>
                 <a:latin typeface="Segoe UI" panose="020B0502040204020203" pitchFamily="34" charset="0"/>
               </a:rPr>
@@ -10381,7 +10671,9 @@
             </a:r>
             <a:endParaRPr lang="en-US" sz="2000" dirty="0">
               <a:solidFill>
-                <a:srgbClr val="505050"/>
+                <a:schemeClr val="bg1">
+                  <a:lumMod val="50000"/>
+                </a:schemeClr>
               </a:solidFill>
               <a:latin typeface="Segoe UI" panose="020B0502040204020203" pitchFamily="34" charset="0"/>
             </a:endParaRPr>
@@ -10394,7 +10686,9 @@
             </a:pPr>
             <a:endParaRPr lang="en-US" sz="2000" dirty="0">
               <a:solidFill>
-                <a:srgbClr val="505050"/>
+                <a:schemeClr val="bg1">
+                  <a:lumMod val="50000"/>
+                </a:schemeClr>
               </a:solidFill>
               <a:latin typeface="Segoe UI" panose="020B0502040204020203" pitchFamily="34" charset="0"/>
             </a:endParaRPr>
@@ -10408,7 +10702,9 @@
             <a:r>
               <a:rPr lang="en-US" sz="2000" dirty="0">
                 <a:solidFill>
-                  <a:srgbClr val="505050"/>
+                  <a:schemeClr val="bg1">
+                    <a:lumMod val="50000"/>
+                  </a:schemeClr>
                 </a:solidFill>
                 <a:latin typeface="Segoe UI" panose="020B0502040204020203" pitchFamily="34" charset="0"/>
               </a:rPr>
@@ -10417,7 +10713,9 @@
             <a:r>
               <a:rPr lang="en-US" sz="1400" dirty="0">
                 <a:solidFill>
-                  <a:srgbClr val="505050"/>
+                  <a:schemeClr val="bg1">
+                    <a:lumMod val="50000"/>
+                  </a:schemeClr>
                 </a:solidFill>
                 <a:latin typeface="Segoe UI" panose="020B0502040204020203" pitchFamily="34" charset="0"/>
               </a:rPr>
@@ -10425,7 +10723,9 @@
             </a:r>
             <a:endParaRPr lang="en-US" sz="2000" dirty="0">
               <a:solidFill>
-                <a:srgbClr val="505050"/>
+                <a:schemeClr val="bg1">
+                  <a:lumMod val="50000"/>
+                </a:schemeClr>
               </a:solidFill>
               <a:latin typeface="Segoe UI" panose="020B0502040204020203" pitchFamily="34" charset="0"/>
             </a:endParaRPr>

</xml_diff>